<commit_message>
updated on 5th october
</commit_message>
<xml_diff>
--- a/Selenium.pptx
+++ b/Selenium.pptx
@@ -288,7 +288,7 @@
           <a:p>
             <a:fld id="{4225C52C-500C-4CC1-8D83-B2533A70AADB}" type="datetimeFigureOut">
               <a:rPr lang="en-US" smtClean="0"/>
-              <a:t>8/25/2022</a:t>
+              <a:t>9/16/2022</a:t>
             </a:fld>
             <a:endParaRPr lang="en-US"/>
           </a:p>
@@ -486,7 +486,7 @@
           <a:p>
             <a:fld id="{4225C52C-500C-4CC1-8D83-B2533A70AADB}" type="datetimeFigureOut">
               <a:rPr lang="en-US" smtClean="0"/>
-              <a:t>8/25/2022</a:t>
+              <a:t>9/16/2022</a:t>
             </a:fld>
             <a:endParaRPr lang="en-US"/>
           </a:p>
@@ -694,7 +694,7 @@
           <a:p>
             <a:fld id="{4225C52C-500C-4CC1-8D83-B2533A70AADB}" type="datetimeFigureOut">
               <a:rPr lang="en-US" smtClean="0"/>
-              <a:t>8/25/2022</a:t>
+              <a:t>9/16/2022</a:t>
             </a:fld>
             <a:endParaRPr lang="en-US"/>
           </a:p>
@@ -892,7 +892,7 @@
           <a:p>
             <a:fld id="{4225C52C-500C-4CC1-8D83-B2533A70AADB}" type="datetimeFigureOut">
               <a:rPr lang="en-US" smtClean="0"/>
-              <a:t>8/25/2022</a:t>
+              <a:t>9/16/2022</a:t>
             </a:fld>
             <a:endParaRPr lang="en-US"/>
           </a:p>
@@ -1167,7 +1167,7 @@
           <a:p>
             <a:fld id="{4225C52C-500C-4CC1-8D83-B2533A70AADB}" type="datetimeFigureOut">
               <a:rPr lang="en-US" smtClean="0"/>
-              <a:t>8/25/2022</a:t>
+              <a:t>9/16/2022</a:t>
             </a:fld>
             <a:endParaRPr lang="en-US"/>
           </a:p>
@@ -1432,7 +1432,7 @@
           <a:p>
             <a:fld id="{4225C52C-500C-4CC1-8D83-B2533A70AADB}" type="datetimeFigureOut">
               <a:rPr lang="en-US" smtClean="0"/>
-              <a:t>8/25/2022</a:t>
+              <a:t>9/16/2022</a:t>
             </a:fld>
             <a:endParaRPr lang="en-US"/>
           </a:p>
@@ -1844,7 +1844,7 @@
           <a:p>
             <a:fld id="{4225C52C-500C-4CC1-8D83-B2533A70AADB}" type="datetimeFigureOut">
               <a:rPr lang="en-US" smtClean="0"/>
-              <a:t>8/25/2022</a:t>
+              <a:t>9/16/2022</a:t>
             </a:fld>
             <a:endParaRPr lang="en-US"/>
           </a:p>
@@ -1985,7 +1985,7 @@
           <a:p>
             <a:fld id="{4225C52C-500C-4CC1-8D83-B2533A70AADB}" type="datetimeFigureOut">
               <a:rPr lang="en-US" smtClean="0"/>
-              <a:t>8/25/2022</a:t>
+              <a:t>9/16/2022</a:t>
             </a:fld>
             <a:endParaRPr lang="en-US"/>
           </a:p>
@@ -2098,7 +2098,7 @@
           <a:p>
             <a:fld id="{4225C52C-500C-4CC1-8D83-B2533A70AADB}" type="datetimeFigureOut">
               <a:rPr lang="en-US" smtClean="0"/>
-              <a:t>8/25/2022</a:t>
+              <a:t>9/16/2022</a:t>
             </a:fld>
             <a:endParaRPr lang="en-US"/>
           </a:p>
@@ -2409,7 +2409,7 @@
           <a:p>
             <a:fld id="{4225C52C-500C-4CC1-8D83-B2533A70AADB}" type="datetimeFigureOut">
               <a:rPr lang="en-US" smtClean="0"/>
-              <a:t>8/25/2022</a:t>
+              <a:t>9/16/2022</a:t>
             </a:fld>
             <a:endParaRPr lang="en-US"/>
           </a:p>
@@ -2697,7 +2697,7 @@
           <a:p>
             <a:fld id="{4225C52C-500C-4CC1-8D83-B2533A70AADB}" type="datetimeFigureOut">
               <a:rPr lang="en-US" smtClean="0"/>
-              <a:t>8/25/2022</a:t>
+              <a:t>9/16/2022</a:t>
             </a:fld>
             <a:endParaRPr lang="en-US"/>
           </a:p>
@@ -2938,7 +2938,7 @@
           <a:p>
             <a:fld id="{4225C52C-500C-4CC1-8D83-B2533A70AADB}" type="datetimeFigureOut">
               <a:rPr lang="en-US" smtClean="0"/>
-              <a:t>8/25/2022</a:t>
+              <a:t>9/16/2022</a:t>
             </a:fld>
             <a:endParaRPr lang="en-US"/>
           </a:p>
@@ -13692,8 +13692,8 @@
         </p:nvSpPr>
         <p:spPr>
           <a:xfrm>
-            <a:off x="838200" y="365126"/>
-            <a:ext cx="10515600" cy="748972"/>
+            <a:off x="838200" y="430120"/>
+            <a:ext cx="10515600" cy="618985"/>
           </a:xfrm>
         </p:spPr>
         <p:txBody>

</xml_diff>